<commit_message>
Update Final presentation outline & temporary draft.pptx
</commit_message>
<xml_diff>
--- a/Final presentation outline & temporary draft.pptx
+++ b/Final presentation outline & temporary draft.pptx
@@ -4929,10 +4929,10 @@
               <a:rPr lang="de-DE" dirty="0" err="1" smtClean="0"/>
               <a:t>actin</a:t>
             </a:r>
-            <a:endParaRPr lang="de-DE" smtClean="0"/>
-          </a:p>
-          <a:p>
-            <a:endParaRPr lang="de-DE"/>
+            <a:endParaRPr lang="de-DE" dirty="0" smtClean="0"/>
+          </a:p>
+          <a:p>
+            <a:endParaRPr lang="de-DE" dirty="0"/>
           </a:p>
         </p:txBody>
       </p:sp>

</xml_diff>